<commit_message>
New icons and some work.
</commit_message>
<xml_diff>
--- a/docs/Mockups/First Draft/Draft Dashboard Mockup.pptx
+++ b/docs/Mockups/First Draft/Draft Dashboard Mockup.pptx
@@ -288,7 +288,7 @@
           <a:p>
             <a:fld id="{ECB3C1DC-EE09-436C-876C-1E4BB35BFE0C}" type="datetimeFigureOut">
               <a:rPr lang="en-US" smtClean="0"/>
-              <a:t>1/15/2014</a:t>
+              <a:t>1/16/2014</a:t>
             </a:fld>
             <a:endParaRPr lang="en-US"/>
           </a:p>
@@ -458,7 +458,7 @@
           <a:p>
             <a:fld id="{ECB3C1DC-EE09-436C-876C-1E4BB35BFE0C}" type="datetimeFigureOut">
               <a:rPr lang="en-US" smtClean="0"/>
-              <a:t>1/15/2014</a:t>
+              <a:t>1/16/2014</a:t>
             </a:fld>
             <a:endParaRPr lang="en-US"/>
           </a:p>
@@ -638,7 +638,7 @@
           <a:p>
             <a:fld id="{ECB3C1DC-EE09-436C-876C-1E4BB35BFE0C}" type="datetimeFigureOut">
               <a:rPr lang="en-US" smtClean="0"/>
-              <a:t>1/15/2014</a:t>
+              <a:t>1/16/2014</a:t>
             </a:fld>
             <a:endParaRPr lang="en-US"/>
           </a:p>
@@ -808,7 +808,7 @@
           <a:p>
             <a:fld id="{ECB3C1DC-EE09-436C-876C-1E4BB35BFE0C}" type="datetimeFigureOut">
               <a:rPr lang="en-US" smtClean="0"/>
-              <a:t>1/15/2014</a:t>
+              <a:t>1/16/2014</a:t>
             </a:fld>
             <a:endParaRPr lang="en-US"/>
           </a:p>
@@ -1054,7 +1054,7 @@
           <a:p>
             <a:fld id="{ECB3C1DC-EE09-436C-876C-1E4BB35BFE0C}" type="datetimeFigureOut">
               <a:rPr lang="en-US" smtClean="0"/>
-              <a:t>1/15/2014</a:t>
+              <a:t>1/16/2014</a:t>
             </a:fld>
             <a:endParaRPr lang="en-US"/>
           </a:p>
@@ -1342,7 +1342,7 @@
           <a:p>
             <a:fld id="{ECB3C1DC-EE09-436C-876C-1E4BB35BFE0C}" type="datetimeFigureOut">
               <a:rPr lang="en-US" smtClean="0"/>
-              <a:t>1/15/2014</a:t>
+              <a:t>1/16/2014</a:t>
             </a:fld>
             <a:endParaRPr lang="en-US"/>
           </a:p>
@@ -1764,7 +1764,7 @@
           <a:p>
             <a:fld id="{ECB3C1DC-EE09-436C-876C-1E4BB35BFE0C}" type="datetimeFigureOut">
               <a:rPr lang="en-US" smtClean="0"/>
-              <a:t>1/15/2014</a:t>
+              <a:t>1/16/2014</a:t>
             </a:fld>
             <a:endParaRPr lang="en-US"/>
           </a:p>
@@ -1882,7 +1882,7 @@
           <a:p>
             <a:fld id="{ECB3C1DC-EE09-436C-876C-1E4BB35BFE0C}" type="datetimeFigureOut">
               <a:rPr lang="en-US" smtClean="0"/>
-              <a:t>1/15/2014</a:t>
+              <a:t>1/16/2014</a:t>
             </a:fld>
             <a:endParaRPr lang="en-US"/>
           </a:p>
@@ -1977,7 +1977,7 @@
           <a:p>
             <a:fld id="{ECB3C1DC-EE09-436C-876C-1E4BB35BFE0C}" type="datetimeFigureOut">
               <a:rPr lang="en-US" smtClean="0"/>
-              <a:t>1/15/2014</a:t>
+              <a:t>1/16/2014</a:t>
             </a:fld>
             <a:endParaRPr lang="en-US"/>
           </a:p>
@@ -2254,7 +2254,7 @@
           <a:p>
             <a:fld id="{ECB3C1DC-EE09-436C-876C-1E4BB35BFE0C}" type="datetimeFigureOut">
               <a:rPr lang="en-US" smtClean="0"/>
-              <a:t>1/15/2014</a:t>
+              <a:t>1/16/2014</a:t>
             </a:fld>
             <a:endParaRPr lang="en-US"/>
           </a:p>
@@ -2507,7 +2507,7 @@
           <a:p>
             <a:fld id="{ECB3C1DC-EE09-436C-876C-1E4BB35BFE0C}" type="datetimeFigureOut">
               <a:rPr lang="en-US" smtClean="0"/>
-              <a:t>1/15/2014</a:t>
+              <a:t>1/16/2014</a:t>
             </a:fld>
             <a:endParaRPr lang="en-US"/>
           </a:p>
@@ -2720,7 +2720,7 @@
           <a:p>
             <a:fld id="{ECB3C1DC-EE09-436C-876C-1E4BB35BFE0C}" type="datetimeFigureOut">
               <a:rPr lang="en-US" smtClean="0"/>
-              <a:t>1/15/2014</a:t>
+              <a:t>1/16/2014</a:t>
             </a:fld>
             <a:endParaRPr lang="en-US"/>
           </a:p>
@@ -3618,15 +3618,19 @@
             <a:gsLst>
               <a:gs pos="0">
                 <a:srgbClr val="00B0F0">
-                  <a:lumMod val="20000"/>
-                  <a:lumOff val="80000"/>
+                  <a:lumMod val="40000"/>
+                  <a:lumOff val="60000"/>
                 </a:srgbClr>
               </a:gs>
               <a:gs pos="66000">
-                <a:srgbClr val="00B0F0"/>
+                <a:srgbClr val="00B0F0">
+                  <a:lumMod val="84000"/>
+                </a:srgbClr>
               </a:gs>
               <a:gs pos="100000">
-                <a:srgbClr val="00B0F0"/>
+                <a:srgbClr val="00B0F0">
+                  <a:lumMod val="84000"/>
+                </a:srgbClr>
               </a:gs>
             </a:gsLst>
             <a:lin ang="16200000" scaled="1"/>
@@ -4289,15 +4293,6 @@
               </a:rPr>
               <a:t>Browse through activities to add…</a:t>
             </a:r>
-            <a:endParaRPr lang="en-US" dirty="0" smtClean="0">
-              <a:solidFill>
-                <a:schemeClr val="tx1">
-                  <a:lumMod val="50000"/>
-                  <a:lumOff val="50000"/>
-                </a:schemeClr>
-              </a:solidFill>
-              <a:latin typeface="Calibri Light" panose="020F0302020204030204" pitchFamily="34" charset="0"/>
-            </a:endParaRPr>
           </a:p>
         </p:txBody>
       </p:sp>

</xml_diff>

<commit_message>
Aesthetic changes; almost done with goals.
</commit_message>
<xml_diff>
--- a/docs/Mockups/First Draft/Draft Dashboard Mockup.pptx
+++ b/docs/Mockups/First Draft/Draft Dashboard Mockup.pptx
@@ -288,7 +288,7 @@
           <a:p>
             <a:fld id="{ECB3C1DC-EE09-436C-876C-1E4BB35BFE0C}" type="datetimeFigureOut">
               <a:rPr lang="en-US" smtClean="0"/>
-              <a:t>1/22/2014</a:t>
+              <a:t>1/28/2014</a:t>
             </a:fld>
             <a:endParaRPr lang="en-US"/>
           </a:p>
@@ -458,7 +458,7 @@
           <a:p>
             <a:fld id="{ECB3C1DC-EE09-436C-876C-1E4BB35BFE0C}" type="datetimeFigureOut">
               <a:rPr lang="en-US" smtClean="0"/>
-              <a:t>1/22/2014</a:t>
+              <a:t>1/28/2014</a:t>
             </a:fld>
             <a:endParaRPr lang="en-US"/>
           </a:p>
@@ -638,7 +638,7 @@
           <a:p>
             <a:fld id="{ECB3C1DC-EE09-436C-876C-1E4BB35BFE0C}" type="datetimeFigureOut">
               <a:rPr lang="en-US" smtClean="0"/>
-              <a:t>1/22/2014</a:t>
+              <a:t>1/28/2014</a:t>
             </a:fld>
             <a:endParaRPr lang="en-US"/>
           </a:p>
@@ -808,7 +808,7 @@
           <a:p>
             <a:fld id="{ECB3C1DC-EE09-436C-876C-1E4BB35BFE0C}" type="datetimeFigureOut">
               <a:rPr lang="en-US" smtClean="0"/>
-              <a:t>1/22/2014</a:t>
+              <a:t>1/28/2014</a:t>
             </a:fld>
             <a:endParaRPr lang="en-US"/>
           </a:p>
@@ -1054,7 +1054,7 @@
           <a:p>
             <a:fld id="{ECB3C1DC-EE09-436C-876C-1E4BB35BFE0C}" type="datetimeFigureOut">
               <a:rPr lang="en-US" smtClean="0"/>
-              <a:t>1/22/2014</a:t>
+              <a:t>1/28/2014</a:t>
             </a:fld>
             <a:endParaRPr lang="en-US"/>
           </a:p>
@@ -1342,7 +1342,7 @@
           <a:p>
             <a:fld id="{ECB3C1DC-EE09-436C-876C-1E4BB35BFE0C}" type="datetimeFigureOut">
               <a:rPr lang="en-US" smtClean="0"/>
-              <a:t>1/22/2014</a:t>
+              <a:t>1/28/2014</a:t>
             </a:fld>
             <a:endParaRPr lang="en-US"/>
           </a:p>
@@ -1764,7 +1764,7 @@
           <a:p>
             <a:fld id="{ECB3C1DC-EE09-436C-876C-1E4BB35BFE0C}" type="datetimeFigureOut">
               <a:rPr lang="en-US" smtClean="0"/>
-              <a:t>1/22/2014</a:t>
+              <a:t>1/28/2014</a:t>
             </a:fld>
             <a:endParaRPr lang="en-US"/>
           </a:p>
@@ -1882,7 +1882,7 @@
           <a:p>
             <a:fld id="{ECB3C1DC-EE09-436C-876C-1E4BB35BFE0C}" type="datetimeFigureOut">
               <a:rPr lang="en-US" smtClean="0"/>
-              <a:t>1/22/2014</a:t>
+              <a:t>1/28/2014</a:t>
             </a:fld>
             <a:endParaRPr lang="en-US"/>
           </a:p>
@@ -1977,7 +1977,7 @@
           <a:p>
             <a:fld id="{ECB3C1DC-EE09-436C-876C-1E4BB35BFE0C}" type="datetimeFigureOut">
               <a:rPr lang="en-US" smtClean="0"/>
-              <a:t>1/22/2014</a:t>
+              <a:t>1/28/2014</a:t>
             </a:fld>
             <a:endParaRPr lang="en-US"/>
           </a:p>
@@ -2254,7 +2254,7 @@
           <a:p>
             <a:fld id="{ECB3C1DC-EE09-436C-876C-1E4BB35BFE0C}" type="datetimeFigureOut">
               <a:rPr lang="en-US" smtClean="0"/>
-              <a:t>1/22/2014</a:t>
+              <a:t>1/28/2014</a:t>
             </a:fld>
             <a:endParaRPr lang="en-US"/>
           </a:p>
@@ -2507,7 +2507,7 @@
           <a:p>
             <a:fld id="{ECB3C1DC-EE09-436C-876C-1E4BB35BFE0C}" type="datetimeFigureOut">
               <a:rPr lang="en-US" smtClean="0"/>
-              <a:t>1/22/2014</a:t>
+              <a:t>1/28/2014</a:t>
             </a:fld>
             <a:endParaRPr lang="en-US"/>
           </a:p>
@@ -2720,7 +2720,7 @@
           <a:p>
             <a:fld id="{ECB3C1DC-EE09-436C-876C-1E4BB35BFE0C}" type="datetimeFigureOut">
               <a:rPr lang="en-US" smtClean="0"/>
-              <a:t>1/22/2014</a:t>
+              <a:t>1/28/2014</a:t>
             </a:fld>
             <a:endParaRPr lang="en-US"/>
           </a:p>
@@ -3609,7 +3609,7 @@
             <a:avLst/>
           </a:prstGeom>
           <a:solidFill>
-            <a:srgbClr val="FF0000"/>
+            <a:srgbClr val="C00000"/>
           </a:solidFill>
           <a:ln w="3175">
             <a:solidFill>

</xml_diff>